<commit_message>
Update Airbnb Price Model_CapStone.pptx
update ppt
</commit_message>
<xml_diff>
--- a/Airbnb Price Model/Airbnb Price Model_CapStone.pptx
+++ b/Airbnb Price Model/Airbnb Price Model_CapStone.pptx
@@ -12336,7 +12336,7 @@
           <a:p>
             <a:fld id="{E960D20D-0F46-4AD5-BFC6-7CAA234ED75A}" type="datetimeFigureOut">
               <a:rPr lang="en-US" smtClean="0"/>
-              <a:t>4/7/2020</a:t>
+              <a:t>9/10/2020</a:t>
             </a:fld>
             <a:endParaRPr lang="en-US"/>
           </a:p>
@@ -13032,7 +13032,7 @@
             <a:fld id="{5586B75A-687E-405C-8A0B-8D00578BA2C3}" type="datetimeFigureOut">
               <a:rPr lang="en-US" dirty="0"/>
               <a:pPr/>
-              <a:t>4/7/2020</a:t>
+              <a:t>9/10/2020</a:t>
             </a:fld>
             <a:endParaRPr lang="en-US" dirty="0"/>
           </a:p>
@@ -13199,7 +13199,7 @@
             <a:fld id="{5586B75A-687E-405C-8A0B-8D00578BA2C3}" type="datetimeFigureOut">
               <a:rPr lang="en-US" dirty="0"/>
               <a:pPr/>
-              <a:t>4/7/2020</a:t>
+              <a:t>9/10/2020</a:t>
             </a:fld>
             <a:endParaRPr lang="en-US" dirty="0"/>
           </a:p>
@@ -13376,7 +13376,7 @@
             <a:fld id="{5586B75A-687E-405C-8A0B-8D00578BA2C3}" type="datetimeFigureOut">
               <a:rPr lang="en-US" dirty="0"/>
               <a:pPr/>
-              <a:t>4/7/2020</a:t>
+              <a:t>9/10/2020</a:t>
             </a:fld>
             <a:endParaRPr lang="en-US" dirty="0"/>
           </a:p>
@@ -13543,7 +13543,7 @@
             <a:fld id="{5586B75A-687E-405C-8A0B-8D00578BA2C3}" type="datetimeFigureOut">
               <a:rPr lang="en-US" dirty="0"/>
               <a:pPr/>
-              <a:t>4/7/2020</a:t>
+              <a:t>9/10/2020</a:t>
             </a:fld>
             <a:endParaRPr lang="en-US" dirty="0"/>
           </a:p>
@@ -13798,7 +13798,7 @@
             <a:fld id="{5586B75A-687E-405C-8A0B-8D00578BA2C3}" type="datetimeFigureOut">
               <a:rPr lang="en-US" dirty="0"/>
               <a:pPr/>
-              <a:t>4/7/2020</a:t>
+              <a:t>9/10/2020</a:t>
             </a:fld>
             <a:endParaRPr lang="en-US" dirty="0"/>
           </a:p>
@@ -14083,7 +14083,7 @@
             <a:fld id="{5586B75A-687E-405C-8A0B-8D00578BA2C3}" type="datetimeFigureOut">
               <a:rPr lang="en-US" dirty="0"/>
               <a:pPr/>
-              <a:t>4/7/2020</a:t>
+              <a:t>9/10/2020</a:t>
             </a:fld>
             <a:endParaRPr lang="en-US" dirty="0"/>
           </a:p>
@@ -14522,7 +14522,7 @@
             <a:fld id="{5586B75A-687E-405C-8A0B-8D00578BA2C3}" type="datetimeFigureOut">
               <a:rPr lang="en-US" dirty="0"/>
               <a:pPr/>
-              <a:t>4/7/2020</a:t>
+              <a:t>9/10/2020</a:t>
             </a:fld>
             <a:endParaRPr lang="en-US" dirty="0"/>
           </a:p>
@@ -14637,7 +14637,7 @@
             <a:fld id="{5586B75A-687E-405C-8A0B-8D00578BA2C3}" type="datetimeFigureOut">
               <a:rPr lang="en-US" dirty="0"/>
               <a:pPr/>
-              <a:t>4/7/2020</a:t>
+              <a:t>9/10/2020</a:t>
             </a:fld>
             <a:endParaRPr lang="en-US" dirty="0"/>
           </a:p>
@@ -14729,7 +14729,7 @@
             <a:fld id="{5586B75A-687E-405C-8A0B-8D00578BA2C3}" type="datetimeFigureOut">
               <a:rPr lang="en-US" dirty="0"/>
               <a:pPr/>
-              <a:t>4/7/2020</a:t>
+              <a:t>9/10/2020</a:t>
             </a:fld>
             <a:endParaRPr lang="en-US" dirty="0"/>
           </a:p>
@@ -15014,7 +15014,7 @@
             <a:fld id="{5586B75A-687E-405C-8A0B-8D00578BA2C3}" type="datetimeFigureOut">
               <a:rPr lang="en-US" dirty="0"/>
               <a:pPr/>
-              <a:t>4/7/2020</a:t>
+              <a:t>9/10/2020</a:t>
             </a:fld>
             <a:endParaRPr lang="en-US" dirty="0"/>
           </a:p>
@@ -15284,7 +15284,7 @@
             <a:fld id="{5586B75A-687E-405C-8A0B-8D00578BA2C3}" type="datetimeFigureOut">
               <a:rPr lang="en-US" dirty="0"/>
               <a:pPr/>
-              <a:t>4/7/2020</a:t>
+              <a:t>9/10/2020</a:t>
             </a:fld>
             <a:endParaRPr lang="en-US" dirty="0"/>
           </a:p>
@@ -15578,7 +15578,7 @@
             <a:fld id="{5586B75A-687E-405C-8A0B-8D00578BA2C3}" type="datetimeFigureOut">
               <a:rPr lang="en-US" dirty="0"/>
               <a:pPr/>
-              <a:t>4/7/2020</a:t>
+              <a:t>9/10/2020</a:t>
             </a:fld>
             <a:endParaRPr lang="en-US" dirty="0"/>
           </a:p>
@@ -19145,9 +19145,10 @@
           <a:lstStyle/>
           <a:p>
             <a:r>
-              <a:rPr lang="en-US" dirty="0"/>
-              <a:t>COCLUSION</a:t>
+              <a:rPr lang="en-US"/>
+              <a:t>CONCLUSION</a:t>
             </a:r>
+            <a:endParaRPr lang="en-US" dirty="0"/>
           </a:p>
         </p:txBody>
       </p:sp>

</xml_diff>